<commit_message>
Apply review comments - part 3
</commit_message>
<xml_diff>
--- a/fsh-tank/input/images-source/EncounterStructure.pptx
+++ b/fsh-tank/input/images-source/EncounterStructure.pptx
@@ -104,6 +104,11 @@
       </a:defRPr>
     </a:lvl9pPr>
   </p:defaultTextStyle>
+  <p:extLst>
+    <p:ext uri="{EFAFB233-063F-42B5-8137-9DF3F51BA10A}">
+      <p15:sldGuideLst xmlns:p15="http://schemas.microsoft.com/office/powerpoint/2012/main"/>
+    </p:ext>
+  </p:extLst>
 </p:presentation>
 </file>
 
@@ -256,7 +261,7 @@
           <a:p>
             <a:fld id="{841460FE-8B04-4DFA-A195-FC6E427B59C1}" type="datetimeFigureOut">
               <a:rPr lang="en-GB" smtClean="0"/>
-              <a:t>18/02/2022</a:t>
+              <a:t>29/03/2022</a:t>
             </a:fld>
             <a:endParaRPr lang="en-GB"/>
           </a:p>
@@ -456,7 +461,7 @@
           <a:p>
             <a:fld id="{841460FE-8B04-4DFA-A195-FC6E427B59C1}" type="datetimeFigureOut">
               <a:rPr lang="en-GB" smtClean="0"/>
-              <a:t>18/02/2022</a:t>
+              <a:t>29/03/2022</a:t>
             </a:fld>
             <a:endParaRPr lang="en-GB"/>
           </a:p>
@@ -666,7 +671,7 @@
           <a:p>
             <a:fld id="{841460FE-8B04-4DFA-A195-FC6E427B59C1}" type="datetimeFigureOut">
               <a:rPr lang="en-GB" smtClean="0"/>
-              <a:t>18/02/2022</a:t>
+              <a:t>29/03/2022</a:t>
             </a:fld>
             <a:endParaRPr lang="en-GB"/>
           </a:p>
@@ -866,7 +871,7 @@
           <a:p>
             <a:fld id="{841460FE-8B04-4DFA-A195-FC6E427B59C1}" type="datetimeFigureOut">
               <a:rPr lang="en-GB" smtClean="0"/>
-              <a:t>18/02/2022</a:t>
+              <a:t>29/03/2022</a:t>
             </a:fld>
             <a:endParaRPr lang="en-GB"/>
           </a:p>
@@ -1142,7 +1147,7 @@
           <a:p>
             <a:fld id="{841460FE-8B04-4DFA-A195-FC6E427B59C1}" type="datetimeFigureOut">
               <a:rPr lang="en-GB" smtClean="0"/>
-              <a:t>18/02/2022</a:t>
+              <a:t>29/03/2022</a:t>
             </a:fld>
             <a:endParaRPr lang="en-GB"/>
           </a:p>
@@ -1410,7 +1415,7 @@
           <a:p>
             <a:fld id="{841460FE-8B04-4DFA-A195-FC6E427B59C1}" type="datetimeFigureOut">
               <a:rPr lang="en-GB" smtClean="0"/>
-              <a:t>18/02/2022</a:t>
+              <a:t>29/03/2022</a:t>
             </a:fld>
             <a:endParaRPr lang="en-GB"/>
           </a:p>
@@ -1825,7 +1830,7 @@
           <a:p>
             <a:fld id="{841460FE-8B04-4DFA-A195-FC6E427B59C1}" type="datetimeFigureOut">
               <a:rPr lang="en-GB" smtClean="0"/>
-              <a:t>18/02/2022</a:t>
+              <a:t>29/03/2022</a:t>
             </a:fld>
             <a:endParaRPr lang="en-GB"/>
           </a:p>
@@ -1967,7 +1972,7 @@
           <a:p>
             <a:fld id="{841460FE-8B04-4DFA-A195-FC6E427B59C1}" type="datetimeFigureOut">
               <a:rPr lang="en-GB" smtClean="0"/>
-              <a:t>18/02/2022</a:t>
+              <a:t>29/03/2022</a:t>
             </a:fld>
             <a:endParaRPr lang="en-GB"/>
           </a:p>
@@ -2080,7 +2085,7 @@
           <a:p>
             <a:fld id="{841460FE-8B04-4DFA-A195-FC6E427B59C1}" type="datetimeFigureOut">
               <a:rPr lang="en-GB" smtClean="0"/>
-              <a:t>18/02/2022</a:t>
+              <a:t>29/03/2022</a:t>
             </a:fld>
             <a:endParaRPr lang="en-GB"/>
           </a:p>
@@ -2393,7 +2398,7 @@
           <a:p>
             <a:fld id="{841460FE-8B04-4DFA-A195-FC6E427B59C1}" type="datetimeFigureOut">
               <a:rPr lang="en-GB" smtClean="0"/>
-              <a:t>18/02/2022</a:t>
+              <a:t>29/03/2022</a:t>
             </a:fld>
             <a:endParaRPr lang="en-GB"/>
           </a:p>
@@ -2682,7 +2687,7 @@
           <a:p>
             <a:fld id="{841460FE-8B04-4DFA-A195-FC6E427B59C1}" type="datetimeFigureOut">
               <a:rPr lang="en-GB" smtClean="0"/>
-              <a:t>18/02/2022</a:t>
+              <a:t>29/03/2022</a:t>
             </a:fld>
             <a:endParaRPr lang="en-GB"/>
           </a:p>
@@ -2925,7 +2930,7 @@
           <a:p>
             <a:fld id="{841460FE-8B04-4DFA-A195-FC6E427B59C1}" type="datetimeFigureOut">
               <a:rPr lang="en-GB" smtClean="0"/>
-              <a:t>18/02/2022</a:t>
+              <a:t>29/03/2022</a:t>
             </a:fld>
             <a:endParaRPr lang="en-GB"/>
           </a:p>
@@ -3716,7 +3721,7 @@
             <a:pPr algn="ctr"/>
             <a:r>
               <a:rPr lang="en-GB" b="1" dirty="0"/>
-              <a:t>Maturity Level 1</a:t>
+              <a:t>Core</a:t>
             </a:r>
           </a:p>
         </p:txBody>
@@ -3735,8 +3740,8 @@
         </p:nvSpPr>
         <p:spPr>
           <a:xfrm rot="16200000">
-            <a:off x="-572393" y="3051540"/>
-            <a:ext cx="1781294" cy="369332"/>
+            <a:off x="-382167" y="3021905"/>
+            <a:ext cx="1421323" cy="646331"/>
           </a:xfrm>
           <a:prstGeom prst="rect">
             <a:avLst/>
@@ -3752,7 +3757,7 @@
             <a:pPr algn="ctr"/>
             <a:r>
               <a:rPr lang="en-GB" b="1" dirty="0"/>
-              <a:t>Maturity Level 2</a:t>
+              <a:t>Grouping - Time</a:t>
             </a:r>
           </a:p>
         </p:txBody>
@@ -3771,8 +3776,8 @@
         </p:nvSpPr>
         <p:spPr>
           <a:xfrm rot="16200000">
-            <a:off x="-572393" y="5024612"/>
-            <a:ext cx="1781294" cy="369332"/>
+            <a:off x="-610540" y="4924259"/>
+            <a:ext cx="1857589" cy="646331"/>
           </a:xfrm>
           <a:prstGeom prst="rect">
             <a:avLst/>
@@ -3788,7 +3793,7 @@
             <a:pPr algn="ctr"/>
             <a:r>
               <a:rPr lang="en-GB" b="1" dirty="0"/>
-              <a:t>Maturity Level 3</a:t>
+              <a:t>Grouping - Condition</a:t>
             </a:r>
           </a:p>
         </p:txBody>

</xml_diff>